<commit_message>
Fixes and updates on ORM slides
</commit_message>
<xml_diff>
--- a/Courses/Software-Sciences/Module-3-Databases-New/14-Connection-Between-C#-and-Database/14-Connection-Between-C#-and-Database.pptx
+++ b/Courses/Software-Sciences/Module-3-Databases-New/14-Connection-Between-C#-and-Database/14-Connection-Between-C#-and-Database.pptx
@@ -482,7 +482,7 @@
           <a:p>
             <a:fld id="{4E087215-0C8F-4762-A664-737A353EC9A4}" type="datetimeFigureOut">
               <a:rPr lang="bg-BG" smtClean="0"/>
-              <a:t>27.11.2023 г.</a:t>
+              <a:t>18.4.2024 г.</a:t>
             </a:fld>
             <a:endParaRPr lang="bg-BG"/>
           </a:p>
@@ -678,7 +678,7 @@
           <a:p>
             <a:fld id="{72D84649-876A-46C9-8472-14CB09C070D8}" type="datetimeFigureOut">
               <a:rPr lang="en-US" smtClean="0"/>
-              <a:t>11/27/2023</a:t>
+              <a:t>4/18/2024</a:t>
             </a:fld>
             <a:endParaRPr lang="en-US"/>
           </a:p>
@@ -9572,7 +9572,19 @@
           <a:p>
             <a:r>
               <a:rPr lang="ru-RU" sz="3500" dirty="0"/>
-              <a:t>Управлява моделни класове с помощта на</a:t>
+              <a:t>Управлява </a:t>
+            </a:r>
+            <a:r>
+              <a:rPr lang="ru-RU" sz="3500" b="1" dirty="0">
+                <a:solidFill>
+                  <a:schemeClr val="bg1"/>
+                </a:solidFill>
+              </a:rPr>
+              <a:t>моделни класове </a:t>
+            </a:r>
+            <a:r>
+              <a:rPr lang="ru-RU" sz="3500" dirty="0"/>
+              <a:t>с помощта на</a:t>
             </a:r>
             <a:r>
               <a:rPr lang="bg-BG" sz="3500" dirty="0"/>
@@ -11717,8 +11729,8 @@
           </a:xfrm>
           <a:prstGeom prst="wedgeRoundRectCallout">
             <a:avLst>
-              <a:gd name="adj1" fmla="val -68346"/>
-              <a:gd name="adj2" fmla="val -43717"/>
+              <a:gd name="adj1" fmla="val -68613"/>
+              <a:gd name="adj2" fmla="val -40701"/>
               <a:gd name="adj3" fmla="val 16667"/>
             </a:avLst>
           </a:prstGeom>
@@ -12566,6 +12578,110 @@
           </a:p>
         </p:txBody>
       </p:sp>
+      <p:sp>
+        <p:nvSpPr>
+          <p:cNvPr id="5" name="AutoShape 5">
+            <a:extLst>
+              <a:ext uri="{FF2B5EF4-FFF2-40B4-BE49-F238E27FC236}">
+                <a16:creationId xmlns:a16="http://schemas.microsoft.com/office/drawing/2014/main" id="{339FD61F-76D1-5E74-E31C-42C190AD4B83}"/>
+              </a:ext>
+            </a:extLst>
+          </p:cNvPr>
+          <p:cNvSpPr>
+            <a:spLocks noChangeArrowheads="1"/>
+          </p:cNvSpPr>
+          <p:nvPr/>
+        </p:nvSpPr>
+        <p:spPr bwMode="auto">
+          <a:xfrm>
+            <a:off x="6116346" y="3156070"/>
+            <a:ext cx="2389557" cy="804438"/>
+          </a:xfrm>
+          <a:prstGeom prst="wedgeRoundRectCallout">
+            <a:avLst>
+              <a:gd name="adj1" fmla="val 70528"/>
+              <a:gd name="adj2" fmla="val 49177"/>
+              <a:gd name="adj3" fmla="val 16667"/>
+            </a:avLst>
+          </a:prstGeom>
+          <a:solidFill>
+            <a:schemeClr val="tx1">
+              <a:alpha val="80000"/>
+            </a:schemeClr>
+          </a:solidFill>
+          <a:ln w="19050">
+            <a:solidFill>
+              <a:schemeClr val="tx1">
+                <a:alpha val="80000"/>
+              </a:schemeClr>
+            </a:solidFill>
+          </a:ln>
+          <a:effectLst/>
+        </p:spPr>
+        <p:style>
+          <a:lnRef idx="2">
+            <a:schemeClr val="accent1">
+              <a:shade val="50000"/>
+            </a:schemeClr>
+          </a:lnRef>
+          <a:fillRef idx="1001">
+            <a:schemeClr val="dk2"/>
+          </a:fillRef>
+          <a:effectRef idx="0">
+            <a:schemeClr val="accent1"/>
+          </a:effectRef>
+          <a:fontRef idx="minor">
+            <a:schemeClr val="lt1"/>
+          </a:fontRef>
+        </p:style>
+        <p:txBody>
+          <a:bodyPr rot="0" spcFirstLastPara="0" vertOverflow="overflow" horzOverflow="overflow" vert="horz" wrap="square" lIns="91440" tIns="45720" rIns="91440" bIns="45720" numCol="1" spcCol="0" rtlCol="0" fromWordArt="0" anchor="ctr" anchorCtr="0" forceAA="0" compatLnSpc="1">
+            <a:prstTxWarp prst="textNoShape">
+              <a:avLst/>
+            </a:prstTxWarp>
+            <a:noAutofit/>
+          </a:bodyPr>
+          <a:lstStyle/>
+          <a:p>
+            <a:pPr algn="ctr"/>
+            <a:r>
+              <a:rPr lang="bg-BG" sz="2000" b="1" noProof="1">
+                <a:solidFill>
+                  <a:srgbClr val="FFFFFF"/>
+                </a:solidFill>
+              </a:rPr>
+              <a:t>Имената са в </a:t>
+            </a:r>
+            <a:r>
+              <a:rPr lang="bg-BG" sz="2000" b="1" noProof="1">
+                <a:solidFill>
+                  <a:schemeClr val="bg1">
+                    <a:lumMod val="60000"/>
+                    <a:lumOff val="40000"/>
+                  </a:schemeClr>
+                </a:solidFill>
+              </a:rPr>
+              <a:t>единствено</a:t>
+            </a:r>
+            <a:r>
+              <a:rPr lang="bg-BG" sz="2000" b="1" noProof="1">
+                <a:solidFill>
+                  <a:srgbClr val="FFFFFF"/>
+                </a:solidFill>
+              </a:rPr>
+              <a:t> число</a:t>
+            </a:r>
+            <a:endParaRPr lang="bg-BG" sz="2000" b="1" noProof="1">
+              <a:solidFill>
+                <a:schemeClr val="bg1">
+                  <a:lumMod val="60000"/>
+                  <a:lumOff val="40000"/>
+                </a:schemeClr>
+              </a:solidFill>
+            </a:endParaRPr>
+          </a:p>
+        </p:txBody>
+      </p:sp>
     </p:spTree>
     <p:extLst>
       <p:ext uri="{BB962C8B-B14F-4D97-AF65-F5344CB8AC3E}">
@@ -12664,6 +12780,51 @@
                       </p:childTnLst>
                     </p:cTn>
                   </p:par>
+                  <p:par>
+                    <p:cTn id="9" fill="hold">
+                      <p:stCondLst>
+                        <p:cond delay="indefinite"/>
+                      </p:stCondLst>
+                      <p:childTnLst>
+                        <p:par>
+                          <p:cTn id="10" fill="hold">
+                            <p:stCondLst>
+                              <p:cond delay="0"/>
+                            </p:stCondLst>
+                            <p:childTnLst>
+                              <p:par>
+                                <p:cTn id="11" presetID="1" presetClass="entr" presetSubtype="0" fill="hold" grpId="0" nodeType="clickEffect">
+                                  <p:stCondLst>
+                                    <p:cond delay="0"/>
+                                  </p:stCondLst>
+                                  <p:childTnLst>
+                                    <p:set>
+                                      <p:cBhvr>
+                                        <p:cTn id="12" dur="1" fill="hold">
+                                          <p:stCondLst>
+                                            <p:cond delay="0"/>
+                                          </p:stCondLst>
+                                        </p:cTn>
+                                        <p:tgtEl>
+                                          <p:spTgt spid="5"/>
+                                        </p:tgtEl>
+                                        <p:attrNameLst>
+                                          <p:attrName>style.visibility</p:attrName>
+                                        </p:attrNameLst>
+                                      </p:cBhvr>
+                                      <p:to>
+                                        <p:strVal val="visible"/>
+                                      </p:to>
+                                    </p:set>
+                                  </p:childTnLst>
+                                </p:cTn>
+                              </p:par>
+                            </p:childTnLst>
+                          </p:cTn>
+                        </p:par>
+                      </p:childTnLst>
+                    </p:cTn>
+                  </p:par>
                 </p:childTnLst>
               </p:cTn>
               <p:prevCondLst>
@@ -12687,6 +12848,7 @@
     </p:tnLst>
     <p:bldLst>
       <p:bldP spid="11" grpId="0" animBg="1"/>
+      <p:bldP spid="5" grpId="0" animBg="1"/>
     </p:bldLst>
   </p:timing>
 </p:sld>
@@ -23875,8 +24037,8 @@
         </p:blipFill>
         <p:spPr bwMode="auto">
           <a:xfrm>
-            <a:off x="7400753" y="1728471"/>
-            <a:ext cx="4719691" cy="2400300"/>
+            <a:off x="7666598" y="1953425"/>
+            <a:ext cx="4359444" cy="2217089"/>
           </a:xfrm>
           <a:prstGeom prst="rect">
             <a:avLst/>

</xml_diff>

<commit_message>
Small changes on EF Core slides
</commit_message>
<xml_diff>
--- a/Courses/Software-Sciences/Module-3-Databases-New/14-Connection-Between-C#-and-Database/14-Connection-Between-C#-and-Database.pptx
+++ b/Courses/Software-Sciences/Module-3-Databases-New/14-Connection-Between-C#-and-Database/14-Connection-Between-C#-and-Database.pptx
@@ -7903,8 +7903,13 @@
             </a:r>
             <a:r>
               <a:rPr lang="bg-BG" sz="4400" dirty="0"/>
-              <a:t>и база данни</a:t>
-            </a:r>
+              <a:t>и </a:t>
+            </a:r>
+            <a:r>
+              <a:rPr lang="bg-BG" sz="4400"/>
+              <a:t>База Данни</a:t>
+            </a:r>
+            <a:endParaRPr lang="bg-BG" sz="4400" dirty="0"/>
           </a:p>
         </p:txBody>
       </p:sp>

</xml_diff>